<commit_message>
update power point presentation
</commit_message>
<xml_diff>
--- a/MockExtJs6_bsd/Documents/Single Page Application (SPA) paradigm.pptx
+++ b/MockExtJs6_bsd/Documents/Single Page Application (SPA) paradigm.pptx
@@ -5,40 +5,43 @@
     <p:sldMasterId id="2147483648" r:id="rId1"/>
   </p:sldMasterIdLst>
   <p:notesMasterIdLst>
-    <p:notesMasterId r:id="rId33"/>
+    <p:notesMasterId r:id="rId36"/>
   </p:notesMasterIdLst>
   <p:sldIdLst>
     <p:sldId id="256" r:id="rId2"/>
     <p:sldId id="257" r:id="rId3"/>
     <p:sldId id="258" r:id="rId4"/>
-    <p:sldId id="259" r:id="rId5"/>
-    <p:sldId id="260" r:id="rId6"/>
-    <p:sldId id="261" r:id="rId7"/>
-    <p:sldId id="262" r:id="rId8"/>
-    <p:sldId id="263" r:id="rId9"/>
-    <p:sldId id="264" r:id="rId10"/>
-    <p:sldId id="265" r:id="rId11"/>
-    <p:sldId id="266" r:id="rId12"/>
-    <p:sldId id="267" r:id="rId13"/>
-    <p:sldId id="268" r:id="rId14"/>
-    <p:sldId id="269" r:id="rId15"/>
-    <p:sldId id="270" r:id="rId16"/>
-    <p:sldId id="271" r:id="rId17"/>
-    <p:sldId id="272" r:id="rId18"/>
-    <p:sldId id="273" r:id="rId19"/>
-    <p:sldId id="274" r:id="rId20"/>
-    <p:sldId id="275" r:id="rId21"/>
-    <p:sldId id="276" r:id="rId22"/>
-    <p:sldId id="277" r:id="rId23"/>
-    <p:sldId id="284" r:id="rId24"/>
-    <p:sldId id="285" r:id="rId25"/>
-    <p:sldId id="286" r:id="rId26"/>
-    <p:sldId id="278" r:id="rId27"/>
-    <p:sldId id="279" r:id="rId28"/>
-    <p:sldId id="280" r:id="rId29"/>
-    <p:sldId id="281" r:id="rId30"/>
-    <p:sldId id="282" r:id="rId31"/>
-    <p:sldId id="283" r:id="rId32"/>
+    <p:sldId id="288" r:id="rId5"/>
+    <p:sldId id="259" r:id="rId6"/>
+    <p:sldId id="289" r:id="rId7"/>
+    <p:sldId id="287" r:id="rId8"/>
+    <p:sldId id="260" r:id="rId9"/>
+    <p:sldId id="261" r:id="rId10"/>
+    <p:sldId id="262" r:id="rId11"/>
+    <p:sldId id="263" r:id="rId12"/>
+    <p:sldId id="264" r:id="rId13"/>
+    <p:sldId id="265" r:id="rId14"/>
+    <p:sldId id="266" r:id="rId15"/>
+    <p:sldId id="267" r:id="rId16"/>
+    <p:sldId id="268" r:id="rId17"/>
+    <p:sldId id="269" r:id="rId18"/>
+    <p:sldId id="270" r:id="rId19"/>
+    <p:sldId id="271" r:id="rId20"/>
+    <p:sldId id="272" r:id="rId21"/>
+    <p:sldId id="273" r:id="rId22"/>
+    <p:sldId id="274" r:id="rId23"/>
+    <p:sldId id="275" r:id="rId24"/>
+    <p:sldId id="276" r:id="rId25"/>
+    <p:sldId id="277" r:id="rId26"/>
+    <p:sldId id="284" r:id="rId27"/>
+    <p:sldId id="285" r:id="rId28"/>
+    <p:sldId id="286" r:id="rId29"/>
+    <p:sldId id="278" r:id="rId30"/>
+    <p:sldId id="279" r:id="rId31"/>
+    <p:sldId id="280" r:id="rId32"/>
+    <p:sldId id="281" r:id="rId33"/>
+    <p:sldId id="282" r:id="rId34"/>
+    <p:sldId id="283" r:id="rId35"/>
   </p:sldIdLst>
   <p:sldSz cx="9144000" cy="6858000" type="screen4x3"/>
   <p:notesSz cx="6858000" cy="9144000"/>
@@ -222,7 +225,7 @@
           <a:p>
             <a:fld id="{0D50811F-7E14-44FD-9748-BD949E989F97}" type="datetimeFigureOut">
               <a:rPr lang="en-US" smtClean="0"/>
-              <a:t>11/16/2016</a:t>
+              <a:t>11/25/2016</a:t>
             </a:fld>
             <a:endParaRPr lang="en-US"/>
           </a:p>
@@ -639,7 +642,7 @@
           <a:p>
             <a:fld id="{3620890A-6A21-4081-A946-9F75F6BA5E6A}" type="slidenum">
               <a:rPr lang="en-US" smtClean="0"/>
-              <a:t>4</a:t>
+              <a:t>5</a:t>
             </a:fld>
             <a:endParaRPr lang="en-US"/>
           </a:p>
@@ -839,7 +842,7 @@
           <a:p>
             <a:fld id="{A7BFF081-8D16-47D5-A506-8FA33EA8AC63}" type="datetimeFigureOut">
               <a:rPr lang="en-US" smtClean="0"/>
-              <a:t>11/16/2016</a:t>
+              <a:t>11/25/2016</a:t>
             </a:fld>
             <a:endParaRPr lang="en-US"/>
           </a:p>
@@ -1009,7 +1012,7 @@
           <a:p>
             <a:fld id="{A7BFF081-8D16-47D5-A506-8FA33EA8AC63}" type="datetimeFigureOut">
               <a:rPr lang="en-US" smtClean="0"/>
-              <a:t>11/16/2016</a:t>
+              <a:t>11/25/2016</a:t>
             </a:fld>
             <a:endParaRPr lang="en-US"/>
           </a:p>
@@ -1189,7 +1192,7 @@
           <a:p>
             <a:fld id="{A7BFF081-8D16-47D5-A506-8FA33EA8AC63}" type="datetimeFigureOut">
               <a:rPr lang="en-US" smtClean="0"/>
-              <a:t>11/16/2016</a:t>
+              <a:t>11/25/2016</a:t>
             </a:fld>
             <a:endParaRPr lang="en-US"/>
           </a:p>
@@ -1359,7 +1362,7 @@
           <a:p>
             <a:fld id="{A7BFF081-8D16-47D5-A506-8FA33EA8AC63}" type="datetimeFigureOut">
               <a:rPr lang="en-US" smtClean="0"/>
-              <a:t>11/16/2016</a:t>
+              <a:t>11/25/2016</a:t>
             </a:fld>
             <a:endParaRPr lang="en-US"/>
           </a:p>
@@ -1605,7 +1608,7 @@
           <a:p>
             <a:fld id="{A7BFF081-8D16-47D5-A506-8FA33EA8AC63}" type="datetimeFigureOut">
               <a:rPr lang="en-US" smtClean="0"/>
-              <a:t>11/16/2016</a:t>
+              <a:t>11/25/2016</a:t>
             </a:fld>
             <a:endParaRPr lang="en-US"/>
           </a:p>
@@ -1893,7 +1896,7 @@
           <a:p>
             <a:fld id="{A7BFF081-8D16-47D5-A506-8FA33EA8AC63}" type="datetimeFigureOut">
               <a:rPr lang="en-US" smtClean="0"/>
-              <a:t>11/16/2016</a:t>
+              <a:t>11/25/2016</a:t>
             </a:fld>
             <a:endParaRPr lang="en-US"/>
           </a:p>
@@ -2315,7 +2318,7 @@
           <a:p>
             <a:fld id="{A7BFF081-8D16-47D5-A506-8FA33EA8AC63}" type="datetimeFigureOut">
               <a:rPr lang="en-US" smtClean="0"/>
-              <a:t>11/16/2016</a:t>
+              <a:t>11/25/2016</a:t>
             </a:fld>
             <a:endParaRPr lang="en-US"/>
           </a:p>
@@ -2433,7 +2436,7 @@
           <a:p>
             <a:fld id="{A7BFF081-8D16-47D5-A506-8FA33EA8AC63}" type="datetimeFigureOut">
               <a:rPr lang="en-US" smtClean="0"/>
-              <a:t>11/16/2016</a:t>
+              <a:t>11/25/2016</a:t>
             </a:fld>
             <a:endParaRPr lang="en-US"/>
           </a:p>
@@ -2528,7 +2531,7 @@
           <a:p>
             <a:fld id="{A7BFF081-8D16-47D5-A506-8FA33EA8AC63}" type="datetimeFigureOut">
               <a:rPr lang="en-US" smtClean="0"/>
-              <a:t>11/16/2016</a:t>
+              <a:t>11/25/2016</a:t>
             </a:fld>
             <a:endParaRPr lang="en-US"/>
           </a:p>
@@ -2805,7 +2808,7 @@
           <a:p>
             <a:fld id="{A7BFF081-8D16-47D5-A506-8FA33EA8AC63}" type="datetimeFigureOut">
               <a:rPr lang="en-US" smtClean="0"/>
-              <a:t>11/16/2016</a:t>
+              <a:t>11/25/2016</a:t>
             </a:fld>
             <a:endParaRPr lang="en-US"/>
           </a:p>
@@ -3058,7 +3061,7 @@
           <a:p>
             <a:fld id="{A7BFF081-8D16-47D5-A506-8FA33EA8AC63}" type="datetimeFigureOut">
               <a:rPr lang="en-US" smtClean="0"/>
-              <a:t>11/16/2016</a:t>
+              <a:t>11/25/2016</a:t>
             </a:fld>
             <a:endParaRPr lang="en-US"/>
           </a:p>
@@ -3271,7 +3274,7 @@
           <a:p>
             <a:fld id="{A7BFF081-8D16-47D5-A506-8FA33EA8AC63}" type="datetimeFigureOut">
               <a:rPr lang="en-US" smtClean="0"/>
-              <a:t>11/16/2016</a:t>
+              <a:t>11/25/2016</a:t>
             </a:fld>
             <a:endParaRPr lang="en-US"/>
           </a:p>
@@ -3700,6 +3703,304 @@
       </p:grpSpPr>
       <p:sp>
         <p:nvSpPr>
+          <p:cNvPr id="3" name="Content Placeholder 2"/>
+          <p:cNvSpPr>
+            <a:spLocks noGrp="1"/>
+          </p:cNvSpPr>
+          <p:nvPr>
+            <p:ph idx="1"/>
+          </p:nvPr>
+        </p:nvSpPr>
+        <p:spPr/>
+        <p:txBody>
+          <a:bodyPr/>
+          <a:lstStyle/>
+          <a:p>
+            <a:pPr marL="0" indent="0">
+              <a:buNone/>
+            </a:pPr>
+            <a:r>
+              <a:rPr lang="en-US" dirty="0"/>
+              <a:t>From Login page depending of user role login module will forward user to either admin or client view.</a:t>
+            </a:r>
+          </a:p>
+          <a:p>
+            <a:pPr marL="0" indent="0">
+              <a:buNone/>
+            </a:pPr>
+            <a:endParaRPr lang="en-US" dirty="0"/>
+          </a:p>
+        </p:txBody>
+      </p:sp>
+      <p:pic>
+        <p:nvPicPr>
+          <p:cNvPr id="4" name="Picture 3"/>
+          <p:cNvPicPr/>
+          <p:nvPr/>
+        </p:nvPicPr>
+        <p:blipFill>
+          <a:blip r:embed="rId2"/>
+          <a:stretch>
+            <a:fillRect/>
+          </a:stretch>
+        </p:blipFill>
+        <p:spPr>
+          <a:xfrm>
+            <a:off x="2809345" y="3200400"/>
+            <a:ext cx="3457575" cy="2686050"/>
+          </a:xfrm>
+          <a:prstGeom prst="rect">
+            <a:avLst/>
+          </a:prstGeom>
+        </p:spPr>
+      </p:pic>
+    </p:spTree>
+    <p:extLst>
+      <p:ext uri="{BB962C8B-B14F-4D97-AF65-F5344CB8AC3E}">
+        <p14:creationId xmlns:p14="http://schemas.microsoft.com/office/powerpoint/2010/main" val="3603245444"/>
+      </p:ext>
+    </p:extLst>
+  </p:cSld>
+  <p:clrMapOvr>
+    <a:masterClrMapping/>
+  </p:clrMapOvr>
+</p:sld>
+</file>
+
+<file path=ppt/slides/slide11.xml><?xml version="1.0" encoding="utf-8"?>
+<p:sld xmlns:a="http://schemas.openxmlformats.org/drawingml/2006/main" xmlns:r="http://schemas.openxmlformats.org/officeDocument/2006/relationships" xmlns:p="http://schemas.openxmlformats.org/presentationml/2006/main">
+  <p:cSld>
+    <p:spTree>
+      <p:nvGrpSpPr>
+        <p:cNvPr id="1" name=""/>
+        <p:cNvGrpSpPr/>
+        <p:nvPr/>
+      </p:nvGrpSpPr>
+      <p:grpSpPr>
+        <a:xfrm>
+          <a:off x="0" y="0"/>
+          <a:ext cx="0" cy="0"/>
+          <a:chOff x="0" y="0"/>
+          <a:chExt cx="0" cy="0"/>
+        </a:xfrm>
+      </p:grpSpPr>
+      <p:sp>
+        <p:nvSpPr>
+          <p:cNvPr id="2" name="Title 1"/>
+          <p:cNvSpPr>
+            <a:spLocks noGrp="1"/>
+          </p:cNvSpPr>
+          <p:nvPr>
+            <p:ph type="title"/>
+          </p:nvPr>
+        </p:nvSpPr>
+        <p:spPr/>
+        <p:txBody>
+          <a:bodyPr/>
+          <a:lstStyle/>
+          <a:p>
+            <a:r>
+              <a:rPr lang="en-US" b="1" dirty="0" smtClean="0"/>
+              <a:t>Admin view</a:t>
+            </a:r>
+            <a:endParaRPr lang="en-US" dirty="0"/>
+          </a:p>
+        </p:txBody>
+      </p:sp>
+      <p:sp>
+        <p:nvSpPr>
+          <p:cNvPr id="3" name="Content Placeholder 2"/>
+          <p:cNvSpPr>
+            <a:spLocks noGrp="1"/>
+          </p:cNvSpPr>
+          <p:nvPr>
+            <p:ph idx="1"/>
+          </p:nvPr>
+        </p:nvSpPr>
+        <p:spPr/>
+        <p:txBody>
+          <a:bodyPr/>
+          <a:lstStyle/>
+          <a:p>
+            <a:pPr marL="0" indent="0">
+              <a:buNone/>
+            </a:pPr>
+            <a:r>
+              <a:rPr lang="en-US" dirty="0" smtClean="0"/>
+              <a:t>Admin </a:t>
+            </a:r>
+            <a:r>
+              <a:rPr lang="en-US" dirty="0"/>
+              <a:t>view allow site admin or business analysts work as they would in desktop application</a:t>
+            </a:r>
+          </a:p>
+          <a:p>
+            <a:endParaRPr lang="en-US" dirty="0"/>
+          </a:p>
+        </p:txBody>
+      </p:sp>
+      <p:pic>
+        <p:nvPicPr>
+          <p:cNvPr id="4" name="Picture 3"/>
+          <p:cNvPicPr/>
+          <p:nvPr/>
+        </p:nvPicPr>
+        <p:blipFill>
+          <a:blip r:embed="rId2"/>
+          <a:stretch>
+            <a:fillRect/>
+          </a:stretch>
+        </p:blipFill>
+        <p:spPr>
+          <a:xfrm>
+            <a:off x="2438399" y="3200400"/>
+            <a:ext cx="3838575" cy="2873375"/>
+          </a:xfrm>
+          <a:prstGeom prst="rect">
+            <a:avLst/>
+          </a:prstGeom>
+        </p:spPr>
+      </p:pic>
+    </p:spTree>
+    <p:extLst>
+      <p:ext uri="{BB962C8B-B14F-4D97-AF65-F5344CB8AC3E}">
+        <p14:creationId xmlns:p14="http://schemas.microsoft.com/office/powerpoint/2010/main" val="653436756"/>
+      </p:ext>
+    </p:extLst>
+  </p:cSld>
+  <p:clrMapOvr>
+    <a:masterClrMapping/>
+  </p:clrMapOvr>
+</p:sld>
+</file>
+
+<file path=ppt/slides/slide12.xml><?xml version="1.0" encoding="utf-8"?>
+<p:sld xmlns:a="http://schemas.openxmlformats.org/drawingml/2006/main" xmlns:r="http://schemas.openxmlformats.org/officeDocument/2006/relationships" xmlns:p="http://schemas.openxmlformats.org/presentationml/2006/main">
+  <p:cSld>
+    <p:spTree>
+      <p:nvGrpSpPr>
+        <p:cNvPr id="1" name=""/>
+        <p:cNvGrpSpPr/>
+        <p:nvPr/>
+      </p:nvGrpSpPr>
+      <p:grpSpPr>
+        <a:xfrm>
+          <a:off x="0" y="0"/>
+          <a:ext cx="0" cy="0"/>
+          <a:chOff x="0" y="0"/>
+          <a:chExt cx="0" cy="0"/>
+        </a:xfrm>
+      </p:grpSpPr>
+      <p:sp>
+        <p:nvSpPr>
+          <p:cNvPr id="2" name="Title 1"/>
+          <p:cNvSpPr>
+            <a:spLocks noGrp="1"/>
+          </p:cNvSpPr>
+          <p:nvPr>
+            <p:ph type="title"/>
+          </p:nvPr>
+        </p:nvSpPr>
+        <p:spPr/>
+        <p:txBody>
+          <a:bodyPr/>
+          <a:lstStyle/>
+          <a:p>
+            <a:r>
+              <a:rPr lang="en-US" dirty="0" smtClean="0"/>
+              <a:t>Client view</a:t>
+            </a:r>
+            <a:endParaRPr lang="en-US" dirty="0"/>
+          </a:p>
+        </p:txBody>
+      </p:sp>
+      <p:sp>
+        <p:nvSpPr>
+          <p:cNvPr id="3" name="Content Placeholder 2"/>
+          <p:cNvSpPr>
+            <a:spLocks noGrp="1"/>
+          </p:cNvSpPr>
+          <p:nvPr>
+            <p:ph idx="1"/>
+          </p:nvPr>
+        </p:nvSpPr>
+        <p:spPr/>
+        <p:txBody>
+          <a:bodyPr/>
+          <a:lstStyle/>
+          <a:p>
+            <a:pPr marL="0" indent="0">
+              <a:buNone/>
+            </a:pPr>
+            <a:r>
+              <a:rPr lang="en-US" dirty="0"/>
+              <a:t>Client view has almost traditional web page look and feel, but in our project we use modern Angular 2 framework which is as close to SPA as </a:t>
+            </a:r>
+            <a:r>
+              <a:rPr lang="en-US" dirty="0" err="1"/>
+              <a:t>ExtJs</a:t>
+            </a:r>
+            <a:r>
+              <a:rPr lang="en-US" dirty="0"/>
+              <a:t> site</a:t>
+            </a:r>
+          </a:p>
+        </p:txBody>
+      </p:sp>
+      <p:pic>
+        <p:nvPicPr>
+          <p:cNvPr id="4" name="Picture 3"/>
+          <p:cNvPicPr/>
+          <p:nvPr/>
+        </p:nvPicPr>
+        <p:blipFill>
+          <a:blip r:embed="rId2"/>
+          <a:stretch>
+            <a:fillRect/>
+          </a:stretch>
+        </p:blipFill>
+        <p:spPr>
+          <a:xfrm>
+            <a:off x="2694027" y="3276600"/>
+            <a:ext cx="3724275" cy="3336290"/>
+          </a:xfrm>
+          <a:prstGeom prst="rect">
+            <a:avLst/>
+          </a:prstGeom>
+        </p:spPr>
+      </p:pic>
+    </p:spTree>
+    <p:extLst>
+      <p:ext uri="{BB962C8B-B14F-4D97-AF65-F5344CB8AC3E}">
+        <p14:creationId xmlns:p14="http://schemas.microsoft.com/office/powerpoint/2010/main" val="1901679857"/>
+      </p:ext>
+    </p:extLst>
+  </p:cSld>
+  <p:clrMapOvr>
+    <a:masterClrMapping/>
+  </p:clrMapOvr>
+</p:sld>
+</file>
+
+<file path=ppt/slides/slide13.xml><?xml version="1.0" encoding="utf-8"?>
+<p:sld xmlns:a="http://schemas.openxmlformats.org/drawingml/2006/main" xmlns:r="http://schemas.openxmlformats.org/officeDocument/2006/relationships" xmlns:p="http://schemas.openxmlformats.org/presentationml/2006/main">
+  <p:cSld>
+    <p:spTree>
+      <p:nvGrpSpPr>
+        <p:cNvPr id="1" name=""/>
+        <p:cNvGrpSpPr/>
+        <p:nvPr/>
+      </p:nvGrpSpPr>
+      <p:grpSpPr>
+        <a:xfrm>
+          <a:off x="0" y="0"/>
+          <a:ext cx="0" cy="0"/>
+          <a:chOff x="0" y="0"/>
+          <a:chExt cx="0" cy="0"/>
+        </a:xfrm>
+      </p:grpSpPr>
+      <p:sp>
+        <p:nvSpPr>
           <p:cNvPr id="2" name="Title 1"/>
           <p:cNvSpPr>
             <a:spLocks noGrp="1"/>
@@ -3774,7 +4075,7 @@
 </p:sld>
 </file>
 
-<file path=ppt/slides/slide11.xml><?xml version="1.0" encoding="utf-8"?>
+<file path=ppt/slides/slide14.xml><?xml version="1.0" encoding="utf-8"?>
 <p:sld xmlns:a="http://schemas.openxmlformats.org/drawingml/2006/main" xmlns:r="http://schemas.openxmlformats.org/officeDocument/2006/relationships" xmlns:p="http://schemas.openxmlformats.org/presentationml/2006/main">
   <p:cSld>
     <p:spTree>
@@ -3876,7 +4177,7 @@
 </p:sld>
 </file>
 
-<file path=ppt/slides/slide12.xml><?xml version="1.0" encoding="utf-8"?>
+<file path=ppt/slides/slide15.xml><?xml version="1.0" encoding="utf-8"?>
 <p:sld xmlns:a="http://schemas.openxmlformats.org/drawingml/2006/main" xmlns:r="http://schemas.openxmlformats.org/officeDocument/2006/relationships" xmlns:p="http://schemas.openxmlformats.org/presentationml/2006/main">
   <p:cSld>
     <p:spTree>
@@ -3990,7 +4291,7 @@
 </p:sld>
 </file>
 
-<file path=ppt/slides/slide13.xml><?xml version="1.0" encoding="utf-8"?>
+<file path=ppt/slides/slide16.xml><?xml version="1.0" encoding="utf-8"?>
 <p:sld xmlns:a="http://schemas.openxmlformats.org/drawingml/2006/main" xmlns:r="http://schemas.openxmlformats.org/officeDocument/2006/relationships" xmlns:p="http://schemas.openxmlformats.org/presentationml/2006/main">
   <p:cSld>
     <p:spTree>
@@ -4147,7 +4448,7 @@
 </p:sld>
 </file>
 
-<file path=ppt/slides/slide14.xml><?xml version="1.0" encoding="utf-8"?>
+<file path=ppt/slides/slide17.xml><?xml version="1.0" encoding="utf-8"?>
 <p:sld xmlns:a="http://schemas.openxmlformats.org/drawingml/2006/main" xmlns:r="http://schemas.openxmlformats.org/officeDocument/2006/relationships" xmlns:p="http://schemas.openxmlformats.org/presentationml/2006/main">
   <p:cSld>
     <p:spTree>
@@ -4286,7 +4587,7 @@
 </p:sld>
 </file>
 
-<file path=ppt/slides/slide15.xml><?xml version="1.0" encoding="utf-8"?>
+<file path=ppt/slides/slide18.xml><?xml version="1.0" encoding="utf-8"?>
 <p:sld xmlns:a="http://schemas.openxmlformats.org/drawingml/2006/main" xmlns:r="http://schemas.openxmlformats.org/officeDocument/2006/relationships" xmlns:p="http://schemas.openxmlformats.org/presentationml/2006/main">
   <p:cSld>
     <p:spTree>
@@ -4406,7 +4707,7 @@
 </p:sld>
 </file>
 
-<file path=ppt/slides/slide16.xml><?xml version="1.0" encoding="utf-8"?>
+<file path=ppt/slides/slide19.xml><?xml version="1.0" encoding="utf-8"?>
 <p:sld xmlns:a="http://schemas.openxmlformats.org/drawingml/2006/main" xmlns:r="http://schemas.openxmlformats.org/officeDocument/2006/relationships" xmlns:p="http://schemas.openxmlformats.org/presentationml/2006/main">
   <p:cSld>
     <p:spTree>
@@ -4637,7 +4938,96 @@
 </p:sld>
 </file>
 
-<file path=ppt/slides/slide17.xml><?xml version="1.0" encoding="utf-8"?>
+<file path=ppt/slides/slide2.xml><?xml version="1.0" encoding="utf-8"?>
+<p:sld xmlns:a="http://schemas.openxmlformats.org/drawingml/2006/main" xmlns:r="http://schemas.openxmlformats.org/officeDocument/2006/relationships" xmlns:p="http://schemas.openxmlformats.org/presentationml/2006/main">
+  <p:cSld>
+    <p:spTree>
+      <p:nvGrpSpPr>
+        <p:cNvPr id="1" name=""/>
+        <p:cNvGrpSpPr/>
+        <p:nvPr/>
+      </p:nvGrpSpPr>
+      <p:grpSpPr>
+        <a:xfrm>
+          <a:off x="0" y="0"/>
+          <a:ext cx="0" cy="0"/>
+          <a:chOff x="0" y="0"/>
+          <a:chExt cx="0" cy="0"/>
+        </a:xfrm>
+      </p:grpSpPr>
+      <p:sp>
+        <p:nvSpPr>
+          <p:cNvPr id="2" name="Title 1"/>
+          <p:cNvSpPr>
+            <a:spLocks noGrp="1"/>
+          </p:cNvSpPr>
+          <p:nvPr>
+            <p:ph type="title"/>
+          </p:nvPr>
+        </p:nvSpPr>
+        <p:spPr/>
+        <p:txBody>
+          <a:bodyPr/>
+          <a:lstStyle/>
+          <a:p>
+            <a:r>
+              <a:rPr lang="en-US" dirty="0" smtClean="0"/>
+              <a:t>What is SPA?</a:t>
+            </a:r>
+            <a:endParaRPr lang="en-US" dirty="0"/>
+          </a:p>
+        </p:txBody>
+      </p:sp>
+      <p:sp>
+        <p:nvSpPr>
+          <p:cNvPr id="3" name="Content Placeholder 2"/>
+          <p:cNvSpPr>
+            <a:spLocks noGrp="1"/>
+          </p:cNvSpPr>
+          <p:nvPr>
+            <p:ph idx="1"/>
+          </p:nvPr>
+        </p:nvSpPr>
+        <p:spPr/>
+        <p:txBody>
+          <a:bodyPr/>
+          <a:lstStyle/>
+          <a:p>
+            <a:pPr marL="0" indent="0">
+              <a:buNone/>
+            </a:pPr>
+            <a:r>
+              <a:rPr lang="en-US" dirty="0"/>
+              <a:t>A single-page application (SPA) is a web application or web site that fits on a single web page with the goal of providing a user experience similar to that of a desktop application. In an SPA, either all necessary code – HTML, JavaScript, and CSS – is retrieved with a single page </a:t>
+            </a:r>
+            <a:r>
+              <a:rPr lang="en-US" dirty="0" smtClean="0"/>
+              <a:t>load, </a:t>
+            </a:r>
+            <a:r>
+              <a:rPr lang="en-US" dirty="0"/>
+              <a:t>or the appropriate resources are dynamically loaded and added to the page as necessary</a:t>
+            </a:r>
+          </a:p>
+          <a:p>
+            <a:endParaRPr lang="en-US" dirty="0"/>
+          </a:p>
+        </p:txBody>
+      </p:sp>
+    </p:spTree>
+    <p:extLst>
+      <p:ext uri="{BB962C8B-B14F-4D97-AF65-F5344CB8AC3E}">
+        <p14:creationId xmlns:p14="http://schemas.microsoft.com/office/powerpoint/2010/main" val="3070028447"/>
+      </p:ext>
+    </p:extLst>
+  </p:cSld>
+  <p:clrMapOvr>
+    <a:masterClrMapping/>
+  </p:clrMapOvr>
+</p:sld>
+</file>
+
+<file path=ppt/slides/slide20.xml><?xml version="1.0" encoding="utf-8"?>
 <p:sld xmlns:a="http://schemas.openxmlformats.org/drawingml/2006/main" xmlns:r="http://schemas.openxmlformats.org/officeDocument/2006/relationships" xmlns:p="http://schemas.openxmlformats.org/presentationml/2006/main">
   <p:cSld>
     <p:spTree>
@@ -4730,7 +5120,7 @@
 </p:sld>
 </file>
 
-<file path=ppt/slides/slide18.xml><?xml version="1.0" encoding="utf-8"?>
+<file path=ppt/slides/slide21.xml><?xml version="1.0" encoding="utf-8"?>
 <p:sld xmlns:a="http://schemas.openxmlformats.org/drawingml/2006/main" xmlns:r="http://schemas.openxmlformats.org/officeDocument/2006/relationships" xmlns:p="http://schemas.openxmlformats.org/presentationml/2006/main">
   <p:cSld>
     <p:spTree>
@@ -4796,11 +5186,7 @@
             </a:pPr>
             <a:r>
               <a:rPr lang="en-US" dirty="0" smtClean="0"/>
-              <a:t>You would be surprised how many packages A</a:t>
-            </a:r>
-            <a:r>
-              <a:rPr lang="en-US" dirty="0" smtClean="0"/>
-              <a:t>ngular2 </a:t>
+              <a:t>You would be surprised how many packages Angular2 </a:t>
             </a:r>
             <a:r>
               <a:rPr lang="en-US" dirty="0"/>
@@ -4865,7 +5251,7 @@
 </p:sld>
 </file>
 
-<file path=ppt/slides/slide19.xml><?xml version="1.0" encoding="utf-8"?>
+<file path=ppt/slides/slide22.xml><?xml version="1.0" encoding="utf-8"?>
 <p:sld xmlns:a="http://schemas.openxmlformats.org/drawingml/2006/main" xmlns:r="http://schemas.openxmlformats.org/officeDocument/2006/relationships" xmlns:p="http://schemas.openxmlformats.org/presentationml/2006/main">
   <p:cSld>
     <p:spTree>
@@ -4998,7 +5384,6 @@
               <a:rPr lang="en-US" dirty="0" smtClean="0"/>
               <a:t> team</a:t>
             </a:r>
-            <a:endParaRPr lang="en-US" dirty="0" smtClean="0"/>
           </a:p>
           <a:p>
             <a:endParaRPr lang="en-US" dirty="0" smtClean="0"/>
@@ -5018,7 +5403,7 @@
 </p:sld>
 </file>
 
-<file path=ppt/slides/slide2.xml><?xml version="1.0" encoding="utf-8"?>
+<file path=ppt/slides/slide23.xml><?xml version="1.0" encoding="utf-8"?>
 <p:sld xmlns:a="http://schemas.openxmlformats.org/drawingml/2006/main" xmlns:r="http://schemas.openxmlformats.org/officeDocument/2006/relationships" xmlns:p="http://schemas.openxmlformats.org/presentationml/2006/main">
   <p:cSld>
     <p:spTree>
@@ -5052,95 +5437,6 @@
           <a:p>
             <a:r>
               <a:rPr lang="en-US" dirty="0" smtClean="0"/>
-              <a:t>What is SPA?</a:t>
-            </a:r>
-            <a:endParaRPr lang="en-US" dirty="0"/>
-          </a:p>
-        </p:txBody>
-      </p:sp>
-      <p:sp>
-        <p:nvSpPr>
-          <p:cNvPr id="3" name="Content Placeholder 2"/>
-          <p:cNvSpPr>
-            <a:spLocks noGrp="1"/>
-          </p:cNvSpPr>
-          <p:nvPr>
-            <p:ph idx="1"/>
-          </p:nvPr>
-        </p:nvSpPr>
-        <p:spPr/>
-        <p:txBody>
-          <a:bodyPr/>
-          <a:lstStyle/>
-          <a:p>
-            <a:pPr marL="0" indent="0">
-              <a:buNone/>
-            </a:pPr>
-            <a:r>
-              <a:rPr lang="en-US" dirty="0"/>
-              <a:t>A single-page application (SPA) is a web application or web site that fits on a single web page with the goal of providing a user experience similar to that of a desktop application. In an SPA, either all necessary code – HTML, JavaScript, and CSS – is retrieved with a single page </a:t>
-            </a:r>
-            <a:r>
-              <a:rPr lang="en-US" dirty="0" smtClean="0"/>
-              <a:t>load, </a:t>
-            </a:r>
-            <a:r>
-              <a:rPr lang="en-US" dirty="0"/>
-              <a:t>or the appropriate resources are dynamically loaded and added to the page as necessary</a:t>
-            </a:r>
-          </a:p>
-          <a:p>
-            <a:endParaRPr lang="en-US" dirty="0"/>
-          </a:p>
-        </p:txBody>
-      </p:sp>
-    </p:spTree>
-    <p:extLst>
-      <p:ext uri="{BB962C8B-B14F-4D97-AF65-F5344CB8AC3E}">
-        <p14:creationId xmlns:p14="http://schemas.microsoft.com/office/powerpoint/2010/main" val="3070028447"/>
-      </p:ext>
-    </p:extLst>
-  </p:cSld>
-  <p:clrMapOvr>
-    <a:masterClrMapping/>
-  </p:clrMapOvr>
-</p:sld>
-</file>
-
-<file path=ppt/slides/slide20.xml><?xml version="1.0" encoding="utf-8"?>
-<p:sld xmlns:a="http://schemas.openxmlformats.org/drawingml/2006/main" xmlns:r="http://schemas.openxmlformats.org/officeDocument/2006/relationships" xmlns:p="http://schemas.openxmlformats.org/presentationml/2006/main">
-  <p:cSld>
-    <p:spTree>
-      <p:nvGrpSpPr>
-        <p:cNvPr id="1" name=""/>
-        <p:cNvGrpSpPr/>
-        <p:nvPr/>
-      </p:nvGrpSpPr>
-      <p:grpSpPr>
-        <a:xfrm>
-          <a:off x="0" y="0"/>
-          <a:ext cx="0" cy="0"/>
-          <a:chOff x="0" y="0"/>
-          <a:chExt cx="0" cy="0"/>
-        </a:xfrm>
-      </p:grpSpPr>
-      <p:sp>
-        <p:nvSpPr>
-          <p:cNvPr id="2" name="Title 1"/>
-          <p:cNvSpPr>
-            <a:spLocks noGrp="1"/>
-          </p:cNvSpPr>
-          <p:nvPr>
-            <p:ph type="title"/>
-          </p:nvPr>
-        </p:nvSpPr>
-        <p:spPr/>
-        <p:txBody>
-          <a:bodyPr/>
-          <a:lstStyle/>
-          <a:p>
-            <a:r>
-              <a:rPr lang="en-US" dirty="0" smtClean="0"/>
               <a:t>Build bundle with NPM</a:t>
             </a:r>
             <a:endParaRPr lang="en-US" dirty="0"/>
@@ -5339,7 +5635,7 @@
 </p:sld>
 </file>
 
-<file path=ppt/slides/slide21.xml><?xml version="1.0" encoding="utf-8"?>
+<file path=ppt/slides/slide24.xml><?xml version="1.0" encoding="utf-8"?>
 <p:sld xmlns:a="http://schemas.openxmlformats.org/drawingml/2006/main" xmlns:r="http://schemas.openxmlformats.org/officeDocument/2006/relationships" xmlns:p="http://schemas.openxmlformats.org/presentationml/2006/main">
   <p:cSld>
     <p:spTree>
@@ -5438,7 +5734,7 @@
 </p:sld>
 </file>
 
-<file path=ppt/slides/slide22.xml><?xml version="1.0" encoding="utf-8"?>
+<file path=ppt/slides/slide25.xml><?xml version="1.0" encoding="utf-8"?>
 <p:sld xmlns:a="http://schemas.openxmlformats.org/drawingml/2006/main" xmlns:r="http://schemas.openxmlformats.org/officeDocument/2006/relationships" xmlns:p="http://schemas.openxmlformats.org/presentationml/2006/main">
   <p:cSld>
     <p:spTree>
@@ -5534,7 +5830,7 @@
 </p:sld>
 </file>
 
-<file path=ppt/slides/slide23.xml><?xml version="1.0" encoding="utf-8"?>
+<file path=ppt/slides/slide26.xml><?xml version="1.0" encoding="utf-8"?>
 <p:sld xmlns:a="http://schemas.openxmlformats.org/drawingml/2006/main" xmlns:r="http://schemas.openxmlformats.org/officeDocument/2006/relationships" xmlns:p="http://schemas.openxmlformats.org/presentationml/2006/main">
   <p:cSld>
     <p:spTree>
@@ -5634,7 +5930,7 @@
 </p:sld>
 </file>
 
-<file path=ppt/slides/slide24.xml><?xml version="1.0" encoding="utf-8"?>
+<file path=ppt/slides/slide27.xml><?xml version="1.0" encoding="utf-8"?>
 <p:sld xmlns:a="http://schemas.openxmlformats.org/drawingml/2006/main" xmlns:r="http://schemas.openxmlformats.org/officeDocument/2006/relationships" xmlns:p="http://schemas.openxmlformats.org/presentationml/2006/main">
   <p:cSld>
     <p:spTree>
@@ -5797,7 +6093,7 @@
 </p:sld>
 </file>
 
-<file path=ppt/slides/slide25.xml><?xml version="1.0" encoding="utf-8"?>
+<file path=ppt/slides/slide28.xml><?xml version="1.0" encoding="utf-8"?>
 <p:sld xmlns:a="http://schemas.openxmlformats.org/drawingml/2006/main" xmlns:r="http://schemas.openxmlformats.org/officeDocument/2006/relationships" xmlns:p="http://schemas.openxmlformats.org/presentationml/2006/main">
   <p:cSld>
     <p:spTree>
@@ -5904,7 +6200,7 @@
 </p:sld>
 </file>
 
-<file path=ppt/slides/slide26.xml><?xml version="1.0" encoding="utf-8"?>
+<file path=ppt/slides/slide29.xml><?xml version="1.0" encoding="utf-8"?>
 <p:sld xmlns:a="http://schemas.openxmlformats.org/drawingml/2006/main" xmlns:r="http://schemas.openxmlformats.org/officeDocument/2006/relationships" xmlns:p="http://schemas.openxmlformats.org/presentationml/2006/main">
   <p:cSld>
     <p:spTree>
@@ -6015,7 +6311,7 @@
 </p:sld>
 </file>
 
-<file path=ppt/slides/slide27.xml><?xml version="1.0" encoding="utf-8"?>
+<file path=ppt/slides/slide3.xml><?xml version="1.0" encoding="utf-8"?>
 <p:sld xmlns:a="http://schemas.openxmlformats.org/drawingml/2006/main" xmlns:r="http://schemas.openxmlformats.org/officeDocument/2006/relationships" xmlns:p="http://schemas.openxmlformats.org/presentationml/2006/main">
   <p:cSld>
     <p:spTree>
@@ -6044,6 +6340,84 @@
         </p:nvSpPr>
         <p:spPr/>
         <p:txBody>
+          <a:bodyPr/>
+          <a:lstStyle/>
+          <a:p>
+            <a:r>
+              <a:rPr lang="en-US" dirty="0"/>
+              <a:t>Multi-page Website (MPW)</a:t>
+            </a:r>
+          </a:p>
+        </p:txBody>
+      </p:sp>
+      <p:pic>
+        <p:nvPicPr>
+          <p:cNvPr id="4" name="Content Placeholder 3"/>
+          <p:cNvPicPr>
+            <a:picLocks noGrp="1"/>
+          </p:cNvPicPr>
+          <p:nvPr>
+            <p:ph idx="1"/>
+          </p:nvPr>
+        </p:nvPicPr>
+        <p:blipFill>
+          <a:blip r:embed="rId2"/>
+          <a:stretch>
+            <a:fillRect/>
+          </a:stretch>
+        </p:blipFill>
+        <p:spPr>
+          <a:xfrm>
+            <a:off x="1924050" y="2391569"/>
+            <a:ext cx="5295900" cy="2943225"/>
+          </a:xfrm>
+          <a:prstGeom prst="rect">
+            <a:avLst/>
+          </a:prstGeom>
+        </p:spPr>
+      </p:pic>
+    </p:spTree>
+    <p:extLst>
+      <p:ext uri="{BB962C8B-B14F-4D97-AF65-F5344CB8AC3E}">
+        <p14:creationId xmlns:p14="http://schemas.microsoft.com/office/powerpoint/2010/main" val="466259373"/>
+      </p:ext>
+    </p:extLst>
+  </p:cSld>
+  <p:clrMapOvr>
+    <a:masterClrMapping/>
+  </p:clrMapOvr>
+</p:sld>
+</file>
+
+<file path=ppt/slides/slide30.xml><?xml version="1.0" encoding="utf-8"?>
+<p:sld xmlns:a="http://schemas.openxmlformats.org/drawingml/2006/main" xmlns:r="http://schemas.openxmlformats.org/officeDocument/2006/relationships" xmlns:p="http://schemas.openxmlformats.org/presentationml/2006/main">
+  <p:cSld>
+    <p:spTree>
+      <p:nvGrpSpPr>
+        <p:cNvPr id="1" name=""/>
+        <p:cNvGrpSpPr/>
+        <p:nvPr/>
+      </p:nvGrpSpPr>
+      <p:grpSpPr>
+        <a:xfrm>
+          <a:off x="0" y="0"/>
+          <a:ext cx="0" cy="0"/>
+          <a:chOff x="0" y="0"/>
+          <a:chExt cx="0" cy="0"/>
+        </a:xfrm>
+      </p:grpSpPr>
+      <p:sp>
+        <p:nvSpPr>
+          <p:cNvPr id="2" name="Title 1"/>
+          <p:cNvSpPr>
+            <a:spLocks noGrp="1"/>
+          </p:cNvSpPr>
+          <p:nvPr>
+            <p:ph type="title"/>
+          </p:nvPr>
+        </p:nvSpPr>
+        <p:spPr/>
+        <p:txBody>
           <a:bodyPr>
             <a:normAutofit/>
           </a:bodyPr>
@@ -6315,7 +6689,7 @@
 </p:sld>
 </file>
 
-<file path=ppt/slides/slide28.xml><?xml version="1.0" encoding="utf-8"?>
+<file path=ppt/slides/slide31.xml><?xml version="1.0" encoding="utf-8"?>
 <p:sld xmlns:a="http://schemas.openxmlformats.org/drawingml/2006/main" xmlns:r="http://schemas.openxmlformats.org/officeDocument/2006/relationships" xmlns:p="http://schemas.openxmlformats.org/presentationml/2006/main">
   <p:cSld>
     <p:spTree>
@@ -6428,7 +6802,7 @@
 </p:sld>
 </file>
 
-<file path=ppt/slides/slide29.xml><?xml version="1.0" encoding="utf-8"?>
+<file path=ppt/slides/slide32.xml><?xml version="1.0" encoding="utf-8"?>
 <p:sld xmlns:a="http://schemas.openxmlformats.org/drawingml/2006/main" xmlns:r="http://schemas.openxmlformats.org/officeDocument/2006/relationships" xmlns:p="http://schemas.openxmlformats.org/presentationml/2006/main">
   <p:cSld>
     <p:spTree>
@@ -6575,85 +6949,7 @@
 </p:sld>
 </file>
 
-<file path=ppt/slides/slide3.xml><?xml version="1.0" encoding="utf-8"?>
-<p:sld xmlns:a="http://schemas.openxmlformats.org/drawingml/2006/main" xmlns:r="http://schemas.openxmlformats.org/officeDocument/2006/relationships" xmlns:p="http://schemas.openxmlformats.org/presentationml/2006/main">
-  <p:cSld>
-    <p:spTree>
-      <p:nvGrpSpPr>
-        <p:cNvPr id="1" name=""/>
-        <p:cNvGrpSpPr/>
-        <p:nvPr/>
-      </p:nvGrpSpPr>
-      <p:grpSpPr>
-        <a:xfrm>
-          <a:off x="0" y="0"/>
-          <a:ext cx="0" cy="0"/>
-          <a:chOff x="0" y="0"/>
-          <a:chExt cx="0" cy="0"/>
-        </a:xfrm>
-      </p:grpSpPr>
-      <p:sp>
-        <p:nvSpPr>
-          <p:cNvPr id="2" name="Title 1"/>
-          <p:cNvSpPr>
-            <a:spLocks noGrp="1"/>
-          </p:cNvSpPr>
-          <p:nvPr>
-            <p:ph type="title"/>
-          </p:nvPr>
-        </p:nvSpPr>
-        <p:spPr/>
-        <p:txBody>
-          <a:bodyPr/>
-          <a:lstStyle/>
-          <a:p>
-            <a:r>
-              <a:rPr lang="en-US" dirty="0"/>
-              <a:t>Multi-page Website (MPW)</a:t>
-            </a:r>
-          </a:p>
-        </p:txBody>
-      </p:sp>
-      <p:pic>
-        <p:nvPicPr>
-          <p:cNvPr id="4" name="Content Placeholder 3"/>
-          <p:cNvPicPr>
-            <a:picLocks noGrp="1"/>
-          </p:cNvPicPr>
-          <p:nvPr>
-            <p:ph idx="1"/>
-          </p:nvPr>
-        </p:nvPicPr>
-        <p:blipFill>
-          <a:blip r:embed="rId2"/>
-          <a:stretch>
-            <a:fillRect/>
-          </a:stretch>
-        </p:blipFill>
-        <p:spPr>
-          <a:xfrm>
-            <a:off x="1924050" y="2391569"/>
-            <a:ext cx="5295900" cy="2943225"/>
-          </a:xfrm>
-          <a:prstGeom prst="rect">
-            <a:avLst/>
-          </a:prstGeom>
-        </p:spPr>
-      </p:pic>
-    </p:spTree>
-    <p:extLst>
-      <p:ext uri="{BB962C8B-B14F-4D97-AF65-F5344CB8AC3E}">
-        <p14:creationId xmlns:p14="http://schemas.microsoft.com/office/powerpoint/2010/main" val="466259373"/>
-      </p:ext>
-    </p:extLst>
-  </p:cSld>
-  <p:clrMapOvr>
-    <a:masterClrMapping/>
-  </p:clrMapOvr>
-</p:sld>
-</file>
-
-<file path=ppt/slides/slide30.xml><?xml version="1.0" encoding="utf-8"?>
+<file path=ppt/slides/slide33.xml><?xml version="1.0" encoding="utf-8"?>
 <p:sld xmlns:a="http://schemas.openxmlformats.org/drawingml/2006/main" xmlns:r="http://schemas.openxmlformats.org/officeDocument/2006/relationships" xmlns:p="http://schemas.openxmlformats.org/presentationml/2006/main">
   <p:cSld>
     <p:spTree>
@@ -6880,7 +7176,7 @@
 </p:sld>
 </file>
 
-<file path=ppt/slides/slide31.xml><?xml version="1.0" encoding="utf-8"?>
+<file path=ppt/slides/slide34.xml><?xml version="1.0" encoding="utf-8"?>
 <p:sld xmlns:a="http://schemas.openxmlformats.org/drawingml/2006/main" xmlns:r="http://schemas.openxmlformats.org/officeDocument/2006/relationships" xmlns:p="http://schemas.openxmlformats.org/presentationml/2006/main">
   <p:cSld>
     <p:spTree>
@@ -7024,6 +7320,487 @@
 </file>
 
 <file path=ppt/slides/slide4.xml><?xml version="1.0" encoding="utf-8"?>
+<p:sld xmlns:a="http://schemas.openxmlformats.org/drawingml/2006/main" xmlns:r="http://schemas.openxmlformats.org/officeDocument/2006/relationships" xmlns:p="http://schemas.openxmlformats.org/presentationml/2006/main">
+  <p:cSld>
+    <p:spTree>
+      <p:nvGrpSpPr>
+        <p:cNvPr id="1" name=""/>
+        <p:cNvGrpSpPr/>
+        <p:nvPr/>
+      </p:nvGrpSpPr>
+      <p:grpSpPr>
+        <a:xfrm>
+          <a:off x="0" y="0"/>
+          <a:ext cx="0" cy="0"/>
+          <a:chOff x="0" y="0"/>
+          <a:chExt cx="0" cy="0"/>
+        </a:xfrm>
+      </p:grpSpPr>
+      <p:graphicFrame>
+        <p:nvGraphicFramePr>
+          <p:cNvPr id="4" name="Table 3"/>
+          <p:cNvGraphicFramePr>
+            <a:graphicFrameLocks noGrp="1"/>
+          </p:cNvGraphicFramePr>
+          <p:nvPr>
+            <p:extLst>
+              <p:ext uri="{D42A27DB-BD31-4B8C-83A1-F6EECF244321}">
+                <p14:modId xmlns:p14="http://schemas.microsoft.com/office/powerpoint/2010/main" val="607802240"/>
+              </p:ext>
+            </p:extLst>
+          </p:nvPr>
+        </p:nvGraphicFramePr>
+        <p:xfrm>
+          <a:off x="380997" y="2209797"/>
+          <a:ext cx="8305802" cy="2163924"/>
+        </p:xfrm>
+        <a:graphic>
+          <a:graphicData uri="http://schemas.openxmlformats.org/drawingml/2006/table">
+            <a:tbl>
+              <a:tblPr firstRow="1" firstCol="1" bandRow="1">
+                <a:tableStyleId>{5C22544A-7EE6-4342-B048-85BDC9FD1C3A}</a:tableStyleId>
+              </a:tblPr>
+              <a:tblGrid>
+                <a:gridCol w="3276603"/>
+                <a:gridCol w="5029199"/>
+              </a:tblGrid>
+              <a:tr h="360654">
+                <a:tc>
+                  <a:txBody>
+                    <a:bodyPr/>
+                    <a:lstStyle/>
+                    <a:p>
+                      <a:pPr marL="0" marR="0">
+                        <a:lnSpc>
+                          <a:spcPct val="115000"/>
+                        </a:lnSpc>
+                        <a:spcBef>
+                          <a:spcPts val="0"/>
+                        </a:spcBef>
+                        <a:spcAft>
+                          <a:spcPts val="0"/>
+                        </a:spcAft>
+                      </a:pPr>
+                      <a:r>
+                        <a:rPr lang="en-US" sz="1100">
+                          <a:effectLst/>
+                        </a:rPr>
+                        <a:t> </a:t>
+                      </a:r>
+                      <a:endParaRPr lang="en-US" sz="1100">
+                        <a:effectLst/>
+                        <a:latin typeface="Calibri"/>
+                        <a:ea typeface="Calibri"/>
+                        <a:cs typeface="Times New Roman"/>
+                      </a:endParaRPr>
+                    </a:p>
+                  </a:txBody>
+                  <a:tcPr marL="68580" marR="68580" marT="0" marB="0"/>
+                </a:tc>
+                <a:tc>
+                  <a:txBody>
+                    <a:bodyPr/>
+                    <a:lstStyle/>
+                    <a:p>
+                      <a:pPr marL="0" marR="0">
+                        <a:lnSpc>
+                          <a:spcPct val="115000"/>
+                        </a:lnSpc>
+                        <a:spcBef>
+                          <a:spcPts val="0"/>
+                        </a:spcBef>
+                        <a:spcAft>
+                          <a:spcPts val="0"/>
+                        </a:spcAft>
+                      </a:pPr>
+                      <a:r>
+                        <a:rPr lang="en-US" sz="1100">
+                          <a:effectLst/>
+                        </a:rPr>
+                        <a:t>JSP</a:t>
+                      </a:r>
+                      <a:endParaRPr lang="en-US" sz="1100">
+                        <a:effectLst/>
+                        <a:latin typeface="Calibri"/>
+                        <a:ea typeface="Calibri"/>
+                        <a:cs typeface="Times New Roman"/>
+                      </a:endParaRPr>
+                    </a:p>
+                  </a:txBody>
+                  <a:tcPr marL="68580" marR="68580" marT="0" marB="0"/>
+                </a:tc>
+              </a:tr>
+              <a:tr h="360654">
+                <a:tc rowSpan="3">
+                  <a:txBody>
+                    <a:bodyPr/>
+                    <a:lstStyle/>
+                    <a:p>
+                      <a:pPr marL="0" marR="0">
+                        <a:lnSpc>
+                          <a:spcPct val="115000"/>
+                        </a:lnSpc>
+                        <a:spcBef>
+                          <a:spcPts val="0"/>
+                        </a:spcBef>
+                        <a:spcAft>
+                          <a:spcPts val="0"/>
+                        </a:spcAft>
+                      </a:pPr>
+                      <a:r>
+                        <a:rPr lang="en-US" sz="1100">
+                          <a:effectLst/>
+                        </a:rPr>
+                        <a:t>Template engines</a:t>
+                      </a:r>
+                      <a:endParaRPr lang="en-US" sz="1100">
+                        <a:effectLst/>
+                        <a:latin typeface="Calibri"/>
+                        <a:ea typeface="Calibri"/>
+                        <a:cs typeface="Times New Roman"/>
+                      </a:endParaRPr>
+                    </a:p>
+                  </a:txBody>
+                  <a:tcPr marL="68580" marR="68580" marT="0" marB="0"/>
+                </a:tc>
+                <a:tc>
+                  <a:txBody>
+                    <a:bodyPr/>
+                    <a:lstStyle/>
+                    <a:p>
+                      <a:pPr marL="0" marR="0">
+                        <a:lnSpc>
+                          <a:spcPct val="115000"/>
+                        </a:lnSpc>
+                        <a:spcBef>
+                          <a:spcPts val="0"/>
+                        </a:spcBef>
+                        <a:spcAft>
+                          <a:spcPts val="0"/>
+                        </a:spcAft>
+                      </a:pPr>
+                      <a:r>
+                        <a:rPr lang="en-US" sz="1100">
+                          <a:effectLst/>
+                        </a:rPr>
+                        <a:t>Thymeleaf + thymeleaf-layout-dialect</a:t>
+                      </a:r>
+                      <a:endParaRPr lang="en-US" sz="1100">
+                        <a:effectLst/>
+                        <a:latin typeface="Calibri"/>
+                        <a:ea typeface="Calibri"/>
+                        <a:cs typeface="Times New Roman"/>
+                      </a:endParaRPr>
+                    </a:p>
+                  </a:txBody>
+                  <a:tcPr marL="68580" marR="68580" marT="0" marB="0"/>
+                </a:tc>
+              </a:tr>
+              <a:tr h="360654">
+                <a:tc vMerge="1">
+                  <a:txBody>
+                    <a:bodyPr/>
+                    <a:lstStyle/>
+                    <a:p>
+                      <a:endParaRPr lang="en-US"/>
+                    </a:p>
+                  </a:txBody>
+                  <a:tcPr/>
+                </a:tc>
+                <a:tc>
+                  <a:txBody>
+                    <a:bodyPr/>
+                    <a:lstStyle/>
+                    <a:p>
+                      <a:pPr marL="0" marR="0">
+                        <a:lnSpc>
+                          <a:spcPct val="115000"/>
+                        </a:lnSpc>
+                        <a:spcBef>
+                          <a:spcPts val="0"/>
+                        </a:spcBef>
+                        <a:spcAft>
+                          <a:spcPts val="0"/>
+                        </a:spcAft>
+                      </a:pPr>
+                      <a:r>
+                        <a:rPr lang="en-US" sz="1100">
+                          <a:effectLst/>
+                        </a:rPr>
+                        <a:t>Freemarker</a:t>
+                      </a:r>
+                      <a:endParaRPr lang="en-US" sz="1100">
+                        <a:effectLst/>
+                        <a:latin typeface="Calibri"/>
+                        <a:ea typeface="Calibri"/>
+                        <a:cs typeface="Times New Roman"/>
+                      </a:endParaRPr>
+                    </a:p>
+                  </a:txBody>
+                  <a:tcPr marL="68580" marR="68580" marT="0" marB="0"/>
+                </a:tc>
+              </a:tr>
+              <a:tr h="360654">
+                <a:tc vMerge="1">
+                  <a:txBody>
+                    <a:bodyPr/>
+                    <a:lstStyle/>
+                    <a:p>
+                      <a:endParaRPr lang="en-US"/>
+                    </a:p>
+                  </a:txBody>
+                  <a:tcPr/>
+                </a:tc>
+                <a:tc>
+                  <a:txBody>
+                    <a:bodyPr/>
+                    <a:lstStyle/>
+                    <a:p>
+                      <a:pPr marL="0" marR="0">
+                        <a:lnSpc>
+                          <a:spcPct val="115000"/>
+                        </a:lnSpc>
+                        <a:spcBef>
+                          <a:spcPts val="0"/>
+                        </a:spcBef>
+                        <a:spcAft>
+                          <a:spcPts val="0"/>
+                        </a:spcAft>
+                      </a:pPr>
+                      <a:r>
+                        <a:rPr lang="en-US" sz="1100">
+                          <a:effectLst/>
+                        </a:rPr>
+                        <a:t>Velocity</a:t>
+                      </a:r>
+                      <a:endParaRPr lang="en-US" sz="1100">
+                        <a:effectLst/>
+                        <a:latin typeface="Calibri"/>
+                        <a:ea typeface="Calibri"/>
+                        <a:cs typeface="Times New Roman"/>
+                      </a:endParaRPr>
+                    </a:p>
+                  </a:txBody>
+                  <a:tcPr marL="68580" marR="68580" marT="0" marB="0"/>
+                </a:tc>
+              </a:tr>
+              <a:tr h="360654">
+                <a:tc rowSpan="2">
+                  <a:txBody>
+                    <a:bodyPr/>
+                    <a:lstStyle/>
+                    <a:p>
+                      <a:pPr marL="0" marR="0">
+                        <a:lnSpc>
+                          <a:spcPct val="115000"/>
+                        </a:lnSpc>
+                        <a:spcBef>
+                          <a:spcPts val="0"/>
+                        </a:spcBef>
+                        <a:spcAft>
+                          <a:spcPts val="0"/>
+                        </a:spcAft>
+                      </a:pPr>
+                      <a:r>
+                        <a:rPr lang="en-US" sz="1100">
+                          <a:effectLst/>
+                        </a:rPr>
+                        <a:t>Layout engines</a:t>
+                      </a:r>
+                      <a:endParaRPr lang="en-US" sz="1100">
+                        <a:effectLst/>
+                        <a:latin typeface="Calibri"/>
+                        <a:ea typeface="Calibri"/>
+                        <a:cs typeface="Times New Roman"/>
+                      </a:endParaRPr>
+                    </a:p>
+                  </a:txBody>
+                  <a:tcPr marL="68580" marR="68580" marT="0" marB="0"/>
+                </a:tc>
+                <a:tc>
+                  <a:txBody>
+                    <a:bodyPr/>
+                    <a:lstStyle/>
+                    <a:p>
+                      <a:pPr marL="0" marR="0">
+                        <a:lnSpc>
+                          <a:spcPct val="115000"/>
+                        </a:lnSpc>
+                        <a:spcBef>
+                          <a:spcPts val="0"/>
+                        </a:spcBef>
+                        <a:spcAft>
+                          <a:spcPts val="0"/>
+                        </a:spcAft>
+                      </a:pPr>
+                      <a:r>
+                        <a:rPr lang="en-US" sz="1100">
+                          <a:effectLst/>
+                        </a:rPr>
+                        <a:t>Apache Tiles</a:t>
+                      </a:r>
+                      <a:endParaRPr lang="en-US" sz="1100">
+                        <a:effectLst/>
+                        <a:latin typeface="Calibri"/>
+                        <a:ea typeface="Calibri"/>
+                        <a:cs typeface="Times New Roman"/>
+                      </a:endParaRPr>
+                    </a:p>
+                  </a:txBody>
+                  <a:tcPr marL="68580" marR="68580" marT="0" marB="0"/>
+                </a:tc>
+              </a:tr>
+              <a:tr h="360654">
+                <a:tc vMerge="1">
+                  <a:txBody>
+                    <a:bodyPr/>
+                    <a:lstStyle/>
+                    <a:p>
+                      <a:endParaRPr lang="en-US"/>
+                    </a:p>
+                  </a:txBody>
+                  <a:tcPr/>
+                </a:tc>
+                <a:tc>
+                  <a:txBody>
+                    <a:bodyPr/>
+                    <a:lstStyle/>
+                    <a:p>
+                      <a:pPr marL="0" marR="0">
+                        <a:lnSpc>
+                          <a:spcPct val="115000"/>
+                        </a:lnSpc>
+                        <a:spcBef>
+                          <a:spcPts val="0"/>
+                        </a:spcBef>
+                        <a:spcAft>
+                          <a:spcPts val="0"/>
+                        </a:spcAft>
+                      </a:pPr>
+                      <a:r>
+                        <a:rPr lang="en-US" sz="1100" dirty="0" err="1">
+                          <a:effectLst/>
+                        </a:rPr>
+                        <a:t>SiteMesh</a:t>
+                      </a:r>
+                      <a:endParaRPr lang="en-US" sz="1100" dirty="0">
+                        <a:effectLst/>
+                        <a:latin typeface="Calibri"/>
+                        <a:ea typeface="Calibri"/>
+                        <a:cs typeface="Times New Roman"/>
+                      </a:endParaRPr>
+                    </a:p>
+                  </a:txBody>
+                  <a:tcPr marL="68580" marR="68580" marT="0" marB="0"/>
+                </a:tc>
+              </a:tr>
+            </a:tbl>
+          </a:graphicData>
+        </a:graphic>
+      </p:graphicFrame>
+      <p:sp>
+        <p:nvSpPr>
+          <p:cNvPr id="5" name="Rectangle 1"/>
+          <p:cNvSpPr>
+            <a:spLocks noChangeArrowheads="1"/>
+          </p:cNvSpPr>
+          <p:nvPr/>
+        </p:nvSpPr>
+        <p:spPr bwMode="auto">
+          <a:xfrm>
+            <a:off x="1331913" y="3284538"/>
+            <a:ext cx="9144000" cy="457200"/>
+          </a:xfrm>
+          <a:prstGeom prst="rect">
+            <a:avLst/>
+          </a:prstGeom>
+          <a:noFill/>
+          <a:ln>
+            <a:noFill/>
+          </a:ln>
+          <a:effectLst/>
+          <a:extLst>
+            <a:ext uri="{909E8E84-426E-40DD-AFC4-6F175D3DCCD1}">
+              <a14:hiddenFill xmlns:a14="http://schemas.microsoft.com/office/drawing/2010/main">
+                <a:solidFill>
+                  <a:schemeClr val="accent1"/>
+                </a:solidFill>
+              </a14:hiddenFill>
+            </a:ext>
+            <a:ext uri="{91240B29-F687-4F45-9708-019B960494DF}">
+              <a14:hiddenLine xmlns:a14="http://schemas.microsoft.com/office/drawing/2010/main" w="9525">
+                <a:solidFill>
+                  <a:schemeClr val="tx1"/>
+                </a:solidFill>
+                <a:miter lim="800000"/>
+                <a:headEnd/>
+                <a:tailEnd/>
+              </a14:hiddenLine>
+            </a:ext>
+            <a:ext uri="{AF507438-7753-43E0-B8FC-AC1667EBCBE1}">
+              <a14:hiddenEffects xmlns:a14="http://schemas.microsoft.com/office/drawing/2010/main">
+                <a:effectLst>
+                  <a:outerShdw dist="35921" dir="2700000" algn="ctr" rotWithShape="0">
+                    <a:schemeClr val="bg2"/>
+                  </a:outerShdw>
+                </a:effectLst>
+              </a14:hiddenEffects>
+            </a:ext>
+          </a:extLst>
+        </p:spPr>
+        <p:txBody>
+          <a:bodyPr vert="horz" wrap="none" lIns="91440" tIns="45720" rIns="91440" bIns="45720" numCol="1" anchor="ctr" anchorCtr="0" compatLnSpc="1">
+            <a:prstTxWarp prst="textNoShape">
+              <a:avLst/>
+            </a:prstTxWarp>
+            <a:spAutoFit/>
+          </a:bodyPr>
+          <a:lstStyle/>
+          <a:p>
+            <a:pPr marL="0" marR="0" lvl="0" indent="0" algn="l" defTabSz="914400" rtl="0" eaLnBrk="1" fontAlgn="base" latinLnBrk="0" hangingPunct="1">
+              <a:lnSpc>
+                <a:spcPct val="100000"/>
+              </a:lnSpc>
+              <a:spcBef>
+                <a:spcPct val="0"/>
+              </a:spcBef>
+              <a:spcAft>
+                <a:spcPct val="0"/>
+              </a:spcAft>
+              <a:buClrTx/>
+              <a:buSzTx/>
+              <a:buFontTx/>
+              <a:buNone/>
+              <a:tabLst/>
+            </a:pPr>
+            <a:endParaRPr kumimoji="0" lang="en-US" altLang="en-US" sz="1800" b="0" i="0" u="none" strike="noStrike" cap="none" normalizeH="0" baseline="0" smtClean="0">
+              <a:ln>
+                <a:noFill/>
+              </a:ln>
+              <a:solidFill>
+                <a:schemeClr val="tx1"/>
+              </a:solidFill>
+              <a:effectLst/>
+              <a:latin typeface="Arial" pitchFamily="34" charset="0"/>
+              <a:cs typeface="Arial" pitchFamily="34" charset="0"/>
+            </a:endParaRPr>
+          </a:p>
+        </p:txBody>
+      </p:sp>
+    </p:spTree>
+    <p:extLst>
+      <p:ext uri="{BB962C8B-B14F-4D97-AF65-F5344CB8AC3E}">
+        <p14:creationId xmlns:p14="http://schemas.microsoft.com/office/powerpoint/2010/main" val="3789749802"/>
+      </p:ext>
+    </p:extLst>
+  </p:cSld>
+  <p:clrMapOvr>
+    <a:masterClrMapping/>
+  </p:clrMapOvr>
+</p:sld>
+</file>
+
+<file path=ppt/slides/slide5.xml><?xml version="1.0" encoding="utf-8"?>
 <p:sld xmlns:a="http://schemas.openxmlformats.org/drawingml/2006/main" xmlns:r="http://schemas.openxmlformats.org/officeDocument/2006/relationships" xmlns:p="http://schemas.openxmlformats.org/presentationml/2006/main">
   <p:cSld>
     <p:spTree>
@@ -7117,142 +7894,6 @@
 </p:sld>
 </file>
 
-<file path=ppt/slides/slide5.xml><?xml version="1.0" encoding="utf-8"?>
-<p:sld xmlns:a="http://schemas.openxmlformats.org/drawingml/2006/main" xmlns:r="http://schemas.openxmlformats.org/officeDocument/2006/relationships" xmlns:p="http://schemas.openxmlformats.org/presentationml/2006/main">
-  <p:cSld>
-    <p:spTree>
-      <p:nvGrpSpPr>
-        <p:cNvPr id="1" name=""/>
-        <p:cNvGrpSpPr/>
-        <p:nvPr/>
-      </p:nvGrpSpPr>
-      <p:grpSpPr>
-        <a:xfrm>
-          <a:off x="0" y="0"/>
-          <a:ext cx="0" cy="0"/>
-          <a:chOff x="0" y="0"/>
-          <a:chExt cx="0" cy="0"/>
-        </a:xfrm>
-      </p:grpSpPr>
-      <p:sp>
-        <p:nvSpPr>
-          <p:cNvPr id="3" name="Content Placeholder 2"/>
-          <p:cNvSpPr>
-            <a:spLocks noGrp="1"/>
-          </p:cNvSpPr>
-          <p:nvPr>
-            <p:ph idx="1"/>
-          </p:nvPr>
-        </p:nvSpPr>
-        <p:spPr/>
-        <p:txBody>
-          <a:bodyPr>
-            <a:normAutofit fontScale="70000" lnSpcReduction="20000"/>
-          </a:bodyPr>
-          <a:lstStyle/>
-          <a:p>
-            <a:pPr marL="0" indent="0">
-              <a:buNone/>
-            </a:pPr>
-            <a:r>
-              <a:rPr lang="en-US" dirty="0"/>
-              <a:t>We already used at least two SPA frameworks such as:</a:t>
-            </a:r>
-          </a:p>
-          <a:p>
-            <a:pPr lvl="0"/>
-            <a:r>
-              <a:rPr lang="en-US" dirty="0" smtClean="0"/>
-              <a:t>Isomorphic </a:t>
-            </a:r>
-            <a:r>
-              <a:rPr lang="en-US" dirty="0" err="1" smtClean="0"/>
-              <a:t>Js</a:t>
-            </a:r>
-            <a:endParaRPr lang="en-US" dirty="0"/>
-          </a:p>
-          <a:p>
-            <a:pPr lvl="0"/>
-            <a:r>
-              <a:rPr lang="en-US" dirty="0" err="1" smtClean="0"/>
-              <a:t>ExtJs</a:t>
-            </a:r>
-            <a:endParaRPr lang="en-US" dirty="0" smtClean="0"/>
-          </a:p>
-          <a:p>
-            <a:pPr marL="0" indent="0">
-              <a:buNone/>
-            </a:pPr>
-            <a:endParaRPr lang="en-US" dirty="0" smtClean="0"/>
-          </a:p>
-          <a:p>
-            <a:pPr marL="0" indent="0">
-              <a:buNone/>
-            </a:pPr>
-            <a:r>
-              <a:rPr lang="en-US" dirty="0" smtClean="0"/>
-              <a:t>The </a:t>
-            </a:r>
-            <a:r>
-              <a:rPr lang="en-US" dirty="0"/>
-              <a:t>problem is that in most cases we were completely ignored SPA paradigm for which those frameworks were introduced. Instead we render new page on almost every request, moreover every page reload </a:t>
-            </a:r>
-            <a:r>
-              <a:rPr lang="en-US" dirty="0" err="1"/>
-              <a:t>javascript</a:t>
-            </a:r>
-            <a:r>
-              <a:rPr lang="en-US" dirty="0"/>
-              <a:t> framework. Even most of browsers supports static resource caching it doesn’t make such approach optimal</a:t>
-            </a:r>
-            <a:r>
-              <a:rPr lang="en-US" b="1" dirty="0"/>
-              <a:t>.</a:t>
-            </a:r>
-            <a:endParaRPr lang="en-US" dirty="0"/>
-          </a:p>
-          <a:p>
-            <a:pPr marL="0" lvl="0" indent="0">
-              <a:buNone/>
-            </a:pPr>
-            <a:endParaRPr lang="en-US" dirty="0" smtClean="0"/>
-          </a:p>
-          <a:p>
-            <a:pPr marL="0" lvl="0" indent="0">
-              <a:buNone/>
-            </a:pPr>
-            <a:r>
-              <a:rPr lang="en-US" dirty="0" smtClean="0"/>
-              <a:t>We haven’t use </a:t>
-            </a:r>
-            <a:endParaRPr lang="en-US" dirty="0"/>
-          </a:p>
-          <a:p>
-            <a:pPr lvl="0"/>
-            <a:r>
-              <a:rPr lang="en-US" dirty="0" smtClean="0"/>
-              <a:t>Angular 2</a:t>
-            </a:r>
-            <a:endParaRPr lang="en-US" dirty="0"/>
-          </a:p>
-          <a:p>
-            <a:endParaRPr lang="en-US" dirty="0"/>
-          </a:p>
-        </p:txBody>
-      </p:sp>
-    </p:spTree>
-    <p:extLst>
-      <p:ext uri="{BB962C8B-B14F-4D97-AF65-F5344CB8AC3E}">
-        <p14:creationId xmlns:p14="http://schemas.microsoft.com/office/powerpoint/2010/main" val="2039020973"/>
-      </p:ext>
-    </p:extLst>
-  </p:cSld>
-  <p:clrMapOvr>
-    <a:masterClrMapping/>
-  </p:clrMapOvr>
-</p:sld>
-</file>
-
 <file path=ppt/slides/slide6.xml><?xml version="1.0" encoding="utf-8"?>
 <p:sld xmlns:a="http://schemas.openxmlformats.org/drawingml/2006/main" xmlns:r="http://schemas.openxmlformats.org/officeDocument/2006/relationships" xmlns:p="http://schemas.openxmlformats.org/presentationml/2006/main">
   <p:cSld>
@@ -7287,12 +7928,9 @@
           <a:p>
             <a:r>
               <a:rPr lang="en-US" dirty="0" smtClean="0"/>
-              <a:t>Proof of concept Mock </a:t>
-            </a:r>
-            <a:r>
-              <a:rPr lang="en-US" dirty="0"/>
-              <a:t>project</a:t>
-            </a:r>
+              <a:t>SPA benefits</a:t>
+            </a:r>
+            <a:endParaRPr lang="en-US" dirty="0"/>
           </a:p>
         </p:txBody>
       </p:sp>
@@ -7309,95 +7947,109 @@
         <p:spPr/>
         <p:txBody>
           <a:bodyPr>
-            <a:normAutofit lnSpcReduction="10000"/>
+            <a:normAutofit fontScale="92500" lnSpcReduction="10000"/>
           </a:bodyPr>
           <a:lstStyle/>
           <a:p>
             <a:r>
+              <a:rPr lang="en-US" dirty="0"/>
+              <a:t>Applications are more fluid and </a:t>
+            </a:r>
+            <a:r>
               <a:rPr lang="en-US" dirty="0" smtClean="0"/>
-              <a:t>Why we need it</a:t>
-            </a:r>
+              <a:t>responsive</a:t>
+            </a:r>
+          </a:p>
+          <a:p>
+            <a:r>
+              <a:rPr lang="fr-FR" dirty="0"/>
+              <a:t>AJAX </a:t>
+            </a:r>
+            <a:r>
+              <a:rPr lang="fr-FR" dirty="0" err="1"/>
+              <a:t>requests</a:t>
+            </a:r>
+            <a:r>
+              <a:rPr lang="fr-FR" dirty="0"/>
+              <a:t> plus JSON </a:t>
+            </a:r>
+            <a:r>
+              <a:rPr lang="fr-FR" dirty="0" err="1" smtClean="0"/>
+              <a:t>responses</a:t>
+            </a:r>
+            <a:r>
+              <a:rPr lang="fr-FR" dirty="0" smtClean="0"/>
+              <a:t> </a:t>
+            </a:r>
+            <a:r>
+              <a:rPr lang="fr-FR" dirty="0" err="1" smtClean="0"/>
+              <a:t>makes</a:t>
+            </a:r>
+            <a:r>
+              <a:rPr lang="fr-FR" dirty="0" smtClean="0"/>
+              <a:t> clean </a:t>
+            </a:r>
+            <a:r>
+              <a:rPr lang="en-US" dirty="0"/>
+              <a:t>separation between the presentation (HTML markup) and application </a:t>
+            </a:r>
+            <a:r>
+              <a:rPr lang="en-US" dirty="0" smtClean="0"/>
+              <a:t>logic</a:t>
+            </a:r>
+          </a:p>
+          <a:p>
+            <a:r>
+              <a:rPr lang="en-US" dirty="0"/>
+              <a:t>As a result with this architecture, the client and the service are independent. </a:t>
+            </a:r>
+            <a:endParaRPr lang="en-US" dirty="0" smtClean="0"/>
           </a:p>
           <a:p>
             <a:pPr lvl="1"/>
             <a:r>
               <a:rPr lang="en-US" dirty="0" smtClean="0"/>
-              <a:t>Experiment = proof</a:t>
-            </a:r>
+              <a:t>You </a:t>
+            </a:r>
+            <a:r>
+              <a:rPr lang="en-US" dirty="0"/>
+              <a:t>could replace the entire back </a:t>
+            </a:r>
+            <a:r>
+              <a:rPr lang="en-US" dirty="0" smtClean="0"/>
+              <a:t>end, </a:t>
+            </a:r>
+            <a:r>
+              <a:rPr lang="en-US" dirty="0"/>
+              <a:t>and </a:t>
+            </a:r>
+            <a:r>
+              <a:rPr lang="en-US" dirty="0" smtClean="0"/>
+              <a:t>that won’t </a:t>
+            </a:r>
+            <a:r>
+              <a:rPr lang="en-US" dirty="0"/>
+              <a:t>break the client. </a:t>
+            </a:r>
+            <a:endParaRPr lang="en-US" dirty="0" smtClean="0"/>
           </a:p>
           <a:p>
             <a:pPr lvl="1"/>
             <a:r>
               <a:rPr lang="en-US" dirty="0" smtClean="0"/>
-              <a:t>Ready to go template project</a:t>
-            </a:r>
-          </a:p>
-          <a:p>
-            <a:pPr lvl="1"/>
-            <a:r>
-              <a:rPr lang="en-US" dirty="0" smtClean="0"/>
-              <a:t>Study</a:t>
-            </a:r>
-          </a:p>
-          <a:p>
-            <a:r>
-              <a:rPr lang="en-US" dirty="0" smtClean="0"/>
-              <a:t>Mock project demonstrate spring security</a:t>
-            </a:r>
-          </a:p>
-          <a:p>
-            <a:r>
-              <a:rPr lang="en-US" dirty="0"/>
-              <a:t>UI </a:t>
-            </a:r>
-            <a:r>
-              <a:rPr lang="en-US" dirty="0" smtClean="0"/>
-              <a:t>front-end </a:t>
-            </a:r>
-            <a:r>
-              <a:rPr lang="en-US" dirty="0"/>
-              <a:t>for site administrators and business analysts based on </a:t>
-            </a:r>
-            <a:r>
-              <a:rPr lang="en-US" dirty="0" err="1"/>
-              <a:t>ExtJs</a:t>
-            </a:r>
-            <a:r>
-              <a:rPr lang="en-US" dirty="0"/>
-              <a:t> </a:t>
-            </a:r>
-            <a:r>
-              <a:rPr lang="en-US" dirty="0" smtClean="0"/>
-              <a:t>framework</a:t>
-            </a:r>
-          </a:p>
-          <a:p>
-            <a:r>
-              <a:rPr lang="en-US" dirty="0" smtClean="0"/>
-              <a:t>UI front-end for</a:t>
-            </a:r>
-            <a:r>
-              <a:rPr lang="en-US" dirty="0" smtClean="0"/>
-              <a:t> </a:t>
-            </a:r>
-            <a:r>
-              <a:rPr lang="en-US" dirty="0"/>
-              <a:t>clients and visitors based on Angular </a:t>
-            </a:r>
-            <a:r>
-              <a:rPr lang="en-US" dirty="0" smtClean="0"/>
-              <a:t>2</a:t>
-            </a:r>
-          </a:p>
-          <a:p>
-            <a:endParaRPr lang="en-US" dirty="0"/>
+              <a:t>The </a:t>
+            </a:r>
+            <a:r>
+              <a:rPr lang="en-US" dirty="0"/>
+              <a:t>reverse is also true—you can replace the entire client app without changing the service layer.</a:t>
+            </a:r>
           </a:p>
         </p:txBody>
       </p:sp>
     </p:spTree>
     <p:extLst>
       <p:ext uri="{BB962C8B-B14F-4D97-AF65-F5344CB8AC3E}">
-        <p14:creationId xmlns:p14="http://schemas.microsoft.com/office/powerpoint/2010/main" val="175757120"/>
+        <p14:creationId xmlns:p14="http://schemas.microsoft.com/office/powerpoint/2010/main" val="3978371006"/>
       </p:ext>
     </p:extLst>
   </p:cSld>
@@ -7426,12 +8078,12 @@
       </p:grpSpPr>
       <p:sp>
         <p:nvSpPr>
-          <p:cNvPr id="3" name="Content Placeholder 2"/>
-          <p:cNvSpPr>
-            <a:spLocks noGrp="1"/>
-          </p:cNvSpPr>
-          <p:nvPr>
-            <p:ph idx="1"/>
+          <p:cNvPr id="2" name="Title 1"/>
+          <p:cNvSpPr>
+            <a:spLocks noGrp="1"/>
+          </p:cNvSpPr>
+          <p:nvPr>
+            <p:ph type="title"/>
           </p:nvPr>
         </p:nvSpPr>
         <p:spPr/>
@@ -7439,48 +8091,126 @@
           <a:bodyPr/>
           <a:lstStyle/>
           <a:p>
-            <a:pPr marL="0" indent="0">
-              <a:buNone/>
-            </a:pPr>
-            <a:r>
-              <a:rPr lang="en-US" dirty="0"/>
-              <a:t>From Login page depending of user role login module will forward user to either admin or client view.</a:t>
-            </a:r>
-          </a:p>
-          <a:p>
-            <a:pPr marL="0" indent="0">
-              <a:buNone/>
-            </a:pPr>
+            <a:r>
+              <a:rPr lang="en-US" dirty="0" smtClean="0"/>
+              <a:t>JSP vs. Angular</a:t>
+            </a:r>
             <a:endParaRPr lang="en-US" dirty="0"/>
           </a:p>
         </p:txBody>
       </p:sp>
       <p:pic>
         <p:nvPicPr>
-          <p:cNvPr id="4" name="Picture 3"/>
-          <p:cNvPicPr/>
+          <p:cNvPr id="1026" name="Picture 2"/>
+          <p:cNvPicPr>
+            <a:picLocks noChangeAspect="1" noChangeArrowheads="1"/>
+          </p:cNvPicPr>
           <p:nvPr/>
         </p:nvPicPr>
         <p:blipFill>
-          <a:blip r:embed="rId2"/>
+          <a:blip r:embed="rId2">
+            <a:extLst>
+              <a:ext uri="{28A0092B-C50C-407E-A947-70E740481C1C}">
+                <a14:useLocalDpi xmlns:a14="http://schemas.microsoft.com/office/drawing/2010/main" val="0"/>
+              </a:ext>
+            </a:extLst>
+          </a:blip>
+          <a:srcRect/>
           <a:stretch>
             <a:fillRect/>
           </a:stretch>
         </p:blipFill>
-        <p:spPr>
+        <p:spPr bwMode="auto">
           <a:xfrm>
-            <a:off x="2809345" y="3200400"/>
-            <a:ext cx="3457575" cy="2686050"/>
+            <a:off x="476992" y="1447801"/>
+            <a:ext cx="8029575" cy="4431722"/>
           </a:xfrm>
           <a:prstGeom prst="rect">
             <a:avLst/>
           </a:prstGeom>
+          <a:noFill/>
+          <a:ln>
+            <a:noFill/>
+          </a:ln>
+          <a:extLst>
+            <a:ext uri="{909E8E84-426E-40DD-AFC4-6F175D3DCCD1}">
+              <a14:hiddenFill xmlns:a14="http://schemas.microsoft.com/office/drawing/2010/main">
+                <a:solidFill>
+                  <a:schemeClr val="accent1"/>
+                </a:solidFill>
+              </a14:hiddenFill>
+            </a:ext>
+            <a:ext uri="{91240B29-F687-4F45-9708-019B960494DF}">
+              <a14:hiddenLine xmlns:a14="http://schemas.microsoft.com/office/drawing/2010/main" w="9525">
+                <a:solidFill>
+                  <a:schemeClr val="tx1"/>
+                </a:solidFill>
+                <a:miter lim="800000"/>
+                <a:headEnd/>
+                <a:tailEnd/>
+              </a14:hiddenLine>
+            </a:ext>
+          </a:extLst>
+        </p:spPr>
+      </p:pic>
+      <p:pic>
+        <p:nvPicPr>
+          <p:cNvPr id="1027" name="Picture 3"/>
+          <p:cNvPicPr>
+            <a:picLocks noChangeAspect="1" noChangeArrowheads="1"/>
+          </p:cNvPicPr>
+          <p:nvPr/>
+        </p:nvPicPr>
+        <p:blipFill>
+          <a:blip r:embed="rId3">
+            <a:extLst>
+              <a:ext uri="{28A0092B-C50C-407E-A947-70E740481C1C}">
+                <a14:useLocalDpi xmlns:a14="http://schemas.microsoft.com/office/drawing/2010/main" val="0"/>
+              </a:ext>
+            </a:extLst>
+          </a:blip>
+          <a:srcRect/>
+          <a:stretch>
+            <a:fillRect/>
+          </a:stretch>
+        </p:blipFill>
+        <p:spPr bwMode="auto">
+          <a:xfrm>
+            <a:off x="476992" y="1332016"/>
+            <a:ext cx="3448050" cy="2200275"/>
+          </a:xfrm>
+          <a:prstGeom prst="rect">
+            <a:avLst/>
+          </a:prstGeom>
+          <a:noFill/>
+          <a:ln>
+            <a:noFill/>
+          </a:ln>
+          <a:extLst>
+            <a:ext uri="{909E8E84-426E-40DD-AFC4-6F175D3DCCD1}">
+              <a14:hiddenFill xmlns:a14="http://schemas.microsoft.com/office/drawing/2010/main">
+                <a:solidFill>
+                  <a:schemeClr val="accent1"/>
+                </a:solidFill>
+              </a14:hiddenFill>
+            </a:ext>
+            <a:ext uri="{91240B29-F687-4F45-9708-019B960494DF}">
+              <a14:hiddenLine xmlns:a14="http://schemas.microsoft.com/office/drawing/2010/main" w="9525">
+                <a:solidFill>
+                  <a:schemeClr val="tx1"/>
+                </a:solidFill>
+                <a:miter lim="800000"/>
+                <a:headEnd/>
+                <a:tailEnd/>
+              </a14:hiddenLine>
+            </a:ext>
+          </a:extLst>
         </p:spPr>
       </p:pic>
     </p:spTree>
     <p:extLst>
       <p:ext uri="{BB962C8B-B14F-4D97-AF65-F5344CB8AC3E}">
-        <p14:creationId xmlns:p14="http://schemas.microsoft.com/office/powerpoint/2010/main" val="3603245444"/>
+        <p14:creationId xmlns:p14="http://schemas.microsoft.com/office/powerpoint/2010/main" val="3500993836"/>
       </p:ext>
     </p:extLst>
   </p:cSld>
@@ -7509,85 +8239,114 @@
       </p:grpSpPr>
       <p:sp>
         <p:nvSpPr>
-          <p:cNvPr id="2" name="Title 1"/>
-          <p:cNvSpPr>
-            <a:spLocks noGrp="1"/>
-          </p:cNvSpPr>
-          <p:nvPr>
-            <p:ph type="title"/>
-          </p:nvPr>
-        </p:nvSpPr>
-        <p:spPr/>
-        <p:txBody>
-          <a:bodyPr/>
-          <a:lstStyle/>
-          <a:p>
-            <a:r>
-              <a:rPr lang="en-US" b="1" dirty="0" smtClean="0"/>
-              <a:t>Admin view</a:t>
+          <p:cNvPr id="3" name="Content Placeholder 2"/>
+          <p:cNvSpPr>
+            <a:spLocks noGrp="1"/>
+          </p:cNvSpPr>
+          <p:nvPr>
+            <p:ph idx="1"/>
+          </p:nvPr>
+        </p:nvSpPr>
+        <p:spPr/>
+        <p:txBody>
+          <a:bodyPr>
+            <a:normAutofit fontScale="70000" lnSpcReduction="20000"/>
+          </a:bodyPr>
+          <a:lstStyle/>
+          <a:p>
+            <a:pPr marL="0" indent="0">
+              <a:buNone/>
+            </a:pPr>
+            <a:r>
+              <a:rPr lang="en-US" dirty="0"/>
+              <a:t>We already used at least two SPA frameworks such as:</a:t>
+            </a:r>
+          </a:p>
+          <a:p>
+            <a:pPr lvl="0"/>
+            <a:r>
+              <a:rPr lang="en-US" dirty="0" smtClean="0"/>
+              <a:t>Isomorphic </a:t>
+            </a:r>
+            <a:r>
+              <a:rPr lang="en-US" dirty="0" err="1" smtClean="0"/>
+              <a:t>Js</a:t>
             </a:r>
             <a:endParaRPr lang="en-US" dirty="0"/>
           </a:p>
-        </p:txBody>
-      </p:sp>
-      <p:sp>
-        <p:nvSpPr>
-          <p:cNvPr id="3" name="Content Placeholder 2"/>
-          <p:cNvSpPr>
-            <a:spLocks noGrp="1"/>
-          </p:cNvSpPr>
-          <p:nvPr>
-            <p:ph idx="1"/>
-          </p:nvPr>
-        </p:nvSpPr>
-        <p:spPr/>
-        <p:txBody>
-          <a:bodyPr/>
-          <a:lstStyle/>
+          <a:p>
+            <a:pPr lvl="0"/>
+            <a:r>
+              <a:rPr lang="en-US" dirty="0" err="1" smtClean="0"/>
+              <a:t>ExtJs</a:t>
+            </a:r>
+            <a:endParaRPr lang="en-US" dirty="0" smtClean="0"/>
+          </a:p>
           <a:p>
             <a:pPr marL="0" indent="0">
               <a:buNone/>
             </a:pPr>
+            <a:endParaRPr lang="en-US" dirty="0" smtClean="0"/>
+          </a:p>
+          <a:p>
+            <a:pPr marL="0" indent="0">
+              <a:buNone/>
+            </a:pPr>
             <a:r>
               <a:rPr lang="en-US" dirty="0" smtClean="0"/>
-              <a:t>Admin </a:t>
-            </a:r>
-            <a:r>
-              <a:rPr lang="en-US" dirty="0"/>
-              <a:t>view allow site admin or business analysts work as they would in desktop application</a:t>
-            </a:r>
-          </a:p>
-          <a:p>
+              <a:t>The </a:t>
+            </a:r>
+            <a:r>
+              <a:rPr lang="en-US" dirty="0"/>
+              <a:t>problem is that in most cases we were completely ignored SPA paradigm for which those frameworks were introduced. Instead we render new page on almost every request, moreover every page reload </a:t>
+            </a:r>
+            <a:r>
+              <a:rPr lang="en-US" dirty="0" err="1"/>
+              <a:t>javascript</a:t>
+            </a:r>
+            <a:r>
+              <a:rPr lang="en-US" dirty="0"/>
+              <a:t> framework. Even most of browsers supports static resource caching it doesn’t make such approach optimal</a:t>
+            </a:r>
+            <a:r>
+              <a:rPr lang="en-US" b="1" dirty="0"/>
+              <a:t>.</a:t>
+            </a:r>
             <a:endParaRPr lang="en-US" dirty="0"/>
           </a:p>
-        </p:txBody>
-      </p:sp>
-      <p:pic>
-        <p:nvPicPr>
-          <p:cNvPr id="4" name="Picture 3"/>
-          <p:cNvPicPr/>
-          <p:nvPr/>
-        </p:nvPicPr>
-        <p:blipFill>
-          <a:blip r:embed="rId2"/>
-          <a:stretch>
-            <a:fillRect/>
-          </a:stretch>
-        </p:blipFill>
-        <p:spPr>
-          <a:xfrm>
-            <a:off x="2438399" y="3200400"/>
-            <a:ext cx="3838575" cy="2873375"/>
-          </a:xfrm>
-          <a:prstGeom prst="rect">
-            <a:avLst/>
-          </a:prstGeom>
-        </p:spPr>
-      </p:pic>
+          <a:p>
+            <a:pPr marL="0" lvl="0" indent="0">
+              <a:buNone/>
+            </a:pPr>
+            <a:endParaRPr lang="en-US" dirty="0" smtClean="0"/>
+          </a:p>
+          <a:p>
+            <a:pPr marL="0" lvl="0" indent="0">
+              <a:buNone/>
+            </a:pPr>
+            <a:r>
+              <a:rPr lang="en-US" dirty="0" smtClean="0"/>
+              <a:t>We haven’t use </a:t>
+            </a:r>
+            <a:endParaRPr lang="en-US" dirty="0"/>
+          </a:p>
+          <a:p>
+            <a:pPr lvl="0"/>
+            <a:r>
+              <a:rPr lang="en-US" dirty="0" smtClean="0"/>
+              <a:t>Angular 2</a:t>
+            </a:r>
+            <a:endParaRPr lang="en-US" dirty="0"/>
+          </a:p>
+          <a:p>
+            <a:endParaRPr lang="en-US" dirty="0"/>
+          </a:p>
+        </p:txBody>
+      </p:sp>
     </p:spTree>
     <p:extLst>
       <p:ext uri="{BB962C8B-B14F-4D97-AF65-F5344CB8AC3E}">
-        <p14:creationId xmlns:p14="http://schemas.microsoft.com/office/powerpoint/2010/main" val="653436756"/>
+        <p14:creationId xmlns:p14="http://schemas.microsoft.com/office/powerpoint/2010/main" val="2039020973"/>
       </p:ext>
     </p:extLst>
   </p:cSld>
@@ -7631,9 +8390,12 @@
           <a:p>
             <a:r>
               <a:rPr lang="en-US" dirty="0" smtClean="0"/>
-              <a:t>Client view</a:t>
-            </a:r>
-            <a:endParaRPr lang="en-US" dirty="0"/>
+              <a:t>Proof of concept Mock </a:t>
+            </a:r>
+            <a:r>
+              <a:rPr lang="en-US" dirty="0"/>
+              <a:t>project</a:t>
+            </a:r>
           </a:p>
         </p:txBody>
       </p:sp>
@@ -7649,15 +8411,56 @@
         </p:nvSpPr>
         <p:spPr/>
         <p:txBody>
-          <a:bodyPr/>
-          <a:lstStyle/>
-          <a:p>
-            <a:pPr marL="0" indent="0">
-              <a:buNone/>
-            </a:pPr>
-            <a:r>
-              <a:rPr lang="en-US" dirty="0"/>
-              <a:t>Client view has almost traditional web page look and feel, but in our project we use modern Angular 2 framework which is as close to SPA as </a:t>
+          <a:bodyPr>
+            <a:normAutofit lnSpcReduction="10000"/>
+          </a:bodyPr>
+          <a:lstStyle/>
+          <a:p>
+            <a:r>
+              <a:rPr lang="en-US" dirty="0" smtClean="0"/>
+              <a:t>Why we need it</a:t>
+            </a:r>
+          </a:p>
+          <a:p>
+            <a:pPr lvl="1"/>
+            <a:r>
+              <a:rPr lang="en-US" dirty="0" smtClean="0"/>
+              <a:t>Experiment = proof</a:t>
+            </a:r>
+          </a:p>
+          <a:p>
+            <a:pPr lvl="1"/>
+            <a:r>
+              <a:rPr lang="en-US" dirty="0" smtClean="0"/>
+              <a:t>Ready to go template project</a:t>
+            </a:r>
+          </a:p>
+          <a:p>
+            <a:pPr lvl="1"/>
+            <a:r>
+              <a:rPr lang="en-US" dirty="0" smtClean="0"/>
+              <a:t>Study new technologies</a:t>
+            </a:r>
+            <a:endParaRPr lang="en-US" dirty="0" smtClean="0"/>
+          </a:p>
+          <a:p>
+            <a:r>
+              <a:rPr lang="en-US" dirty="0" smtClean="0"/>
+              <a:t>Mock project demonstrate spring security</a:t>
+            </a:r>
+          </a:p>
+          <a:p>
+            <a:r>
+              <a:rPr lang="en-US" dirty="0"/>
+              <a:t>UI </a:t>
+            </a:r>
+            <a:r>
+              <a:rPr lang="en-US" dirty="0" smtClean="0"/>
+              <a:t>front-end </a:t>
+            </a:r>
+            <a:r>
+              <a:rPr lang="en-US" dirty="0"/>
+              <a:t>for site administrators and business analysts based on </a:t>
             </a:r>
             <a:r>
               <a:rPr lang="en-US" dirty="0" err="1"/>
@@ -7665,37 +8468,42 @@
             </a:r>
             <a:r>
               <a:rPr lang="en-US" dirty="0"/>
-              <a:t> site</a:t>
-            </a:r>
-          </a:p>
-        </p:txBody>
-      </p:sp>
-      <p:pic>
-        <p:nvPicPr>
-          <p:cNvPr id="4" name="Picture 3"/>
-          <p:cNvPicPr/>
-          <p:nvPr/>
-        </p:nvPicPr>
-        <p:blipFill>
-          <a:blip r:embed="rId2"/>
-          <a:stretch>
-            <a:fillRect/>
-          </a:stretch>
-        </p:blipFill>
-        <p:spPr>
-          <a:xfrm>
-            <a:off x="2694027" y="3276600"/>
-            <a:ext cx="3724275" cy="3336290"/>
-          </a:xfrm>
-          <a:prstGeom prst="rect">
-            <a:avLst/>
-          </a:prstGeom>
-        </p:spPr>
-      </p:pic>
+              <a:t> </a:t>
+            </a:r>
+            <a:r>
+              <a:rPr lang="en-US" dirty="0" smtClean="0"/>
+              <a:t>framework</a:t>
+            </a:r>
+          </a:p>
+          <a:p>
+            <a:r>
+              <a:rPr lang="en-US" dirty="0" smtClean="0"/>
+              <a:t>UI front-end for </a:t>
+            </a:r>
+            <a:r>
+              <a:rPr lang="en-US" dirty="0"/>
+              <a:t>clients and visitors based on Angular </a:t>
+            </a:r>
+            <a:r>
+              <a:rPr lang="en-US" dirty="0" smtClean="0"/>
+              <a:t>2</a:t>
+            </a:r>
+          </a:p>
+          <a:p>
+            <a:pPr marL="0" indent="0">
+              <a:buNone/>
+            </a:pPr>
+            <a:endParaRPr lang="en-US" dirty="0" smtClean="0"/>
+          </a:p>
+          <a:p>
+            <a:endParaRPr lang="en-US" dirty="0"/>
+          </a:p>
+        </p:txBody>
+      </p:sp>
     </p:spTree>
     <p:extLst>
       <p:ext uri="{BB962C8B-B14F-4D97-AF65-F5344CB8AC3E}">
-        <p14:creationId xmlns:p14="http://schemas.microsoft.com/office/powerpoint/2010/main" val="1901679857"/>
+        <p14:creationId xmlns:p14="http://schemas.microsoft.com/office/powerpoint/2010/main" val="175757120"/>
       </p:ext>
     </p:extLst>
   </p:cSld>

</xml_diff>